<commit_message>
More slides and papers
</commit_message>
<xml_diff>
--- a/presentation/michath_slides.pptx
+++ b/presentation/michath_slides.pptx
@@ -5,7 +5,7 @@
     <p:sldMasterId id="2147483660" r:id="rId1"/>
   </p:sldMasterIdLst>
   <p:notesMasterIdLst>
-    <p:notesMasterId r:id="rId12"/>
+    <p:notesMasterId r:id="rId17"/>
   </p:notesMasterIdLst>
   <p:sldIdLst>
     <p:sldId id="256" r:id="rId2"/>
@@ -18,6 +18,11 @@
     <p:sldId id="263" r:id="rId9"/>
     <p:sldId id="264" r:id="rId10"/>
     <p:sldId id="268" r:id="rId11"/>
+    <p:sldId id="269" r:id="rId12"/>
+    <p:sldId id="270" r:id="rId13"/>
+    <p:sldId id="272" r:id="rId14"/>
+    <p:sldId id="271" r:id="rId15"/>
+    <p:sldId id="273" r:id="rId16"/>
   </p:sldIdLst>
   <p:sldSz cx="9144000" cy="6858000" type="screen4x3"/>
   <p:notesSz cx="6858000" cy="9144000"/>
@@ -201,7 +206,7 @@
           <a:p>
             <a:fld id="{56E6D825-14CF-4B20-859D-DEBC615A546A}" type="datetimeFigureOut">
               <a:rPr lang="en-US" smtClean="0"/>
-              <a:t>05-May-15</a:t>
+              <a:t>06-May-15</a:t>
             </a:fld>
             <a:endParaRPr lang="en-US"/>
           </a:p>
@@ -653,7 +658,7 @@
           <a:p>
             <a:fld id="{F2853615-BFDE-46DE-814C-47EC6EF6D371}" type="datetimeFigureOut">
               <a:rPr lang="el-GR" smtClean="0"/>
-              <a:t>5/5/2015</a:t>
+              <a:t>6/5/2015</a:t>
             </a:fld>
             <a:endParaRPr lang="el-GR"/>
           </a:p>
@@ -838,7 +843,7 @@
           <a:p>
             <a:fld id="{F2853615-BFDE-46DE-814C-47EC6EF6D371}" type="datetimeFigureOut">
               <a:rPr lang="el-GR" smtClean="0"/>
-              <a:t>5/5/2015</a:t>
+              <a:t>6/5/2015</a:t>
             </a:fld>
             <a:endParaRPr lang="el-GR"/>
           </a:p>
@@ -1028,7 +1033,7 @@
           <a:p>
             <a:fld id="{F2853615-BFDE-46DE-814C-47EC6EF6D371}" type="datetimeFigureOut">
               <a:rPr lang="el-GR" smtClean="0"/>
-              <a:t>5/5/2015</a:t>
+              <a:t>6/5/2015</a:t>
             </a:fld>
             <a:endParaRPr lang="el-GR"/>
           </a:p>
@@ -1231,7 +1236,7 @@
           <a:p>
             <a:fld id="{F2853615-BFDE-46DE-814C-47EC6EF6D371}" type="datetimeFigureOut">
               <a:rPr lang="el-GR" smtClean="0"/>
-              <a:t>5/5/2015</a:t>
+              <a:t>6/5/2015</a:t>
             </a:fld>
             <a:endParaRPr lang="el-GR"/>
           </a:p>
@@ -1487,7 +1492,7 @@
           <a:p>
             <a:fld id="{F2853615-BFDE-46DE-814C-47EC6EF6D371}" type="datetimeFigureOut">
               <a:rPr lang="el-GR" smtClean="0"/>
-              <a:t>5/5/2015</a:t>
+              <a:t>6/5/2015</a:t>
             </a:fld>
             <a:endParaRPr lang="el-GR"/>
           </a:p>
@@ -1759,7 +1764,7 @@
           <a:p>
             <a:fld id="{F2853615-BFDE-46DE-814C-47EC6EF6D371}" type="datetimeFigureOut">
               <a:rPr lang="el-GR" smtClean="0"/>
-              <a:t>5/5/2015</a:t>
+              <a:t>6/5/2015</a:t>
             </a:fld>
             <a:endParaRPr lang="el-GR"/>
           </a:p>
@@ -2221,7 +2226,7 @@
           <a:p>
             <a:fld id="{F2853615-BFDE-46DE-814C-47EC6EF6D371}" type="datetimeFigureOut">
               <a:rPr lang="el-GR" smtClean="0"/>
-              <a:t>5/5/2015</a:t>
+              <a:t>6/5/2015</a:t>
             </a:fld>
             <a:endParaRPr lang="el-GR"/>
           </a:p>
@@ -2398,7 +2403,7 @@
           <a:p>
             <a:fld id="{F2853615-BFDE-46DE-814C-47EC6EF6D371}" type="datetimeFigureOut">
               <a:rPr lang="el-GR" smtClean="0"/>
-              <a:t>5/5/2015</a:t>
+              <a:t>6/5/2015</a:t>
             </a:fld>
             <a:endParaRPr lang="el-GR"/>
           </a:p>
@@ -2500,7 +2505,7 @@
           <a:p>
             <a:fld id="{F2853615-BFDE-46DE-814C-47EC6EF6D371}" type="datetimeFigureOut">
               <a:rPr lang="el-GR" smtClean="0"/>
-              <a:t>5/5/2015</a:t>
+              <a:t>6/5/2015</a:t>
             </a:fld>
             <a:endParaRPr lang="el-GR"/>
           </a:p>
@@ -2787,7 +2792,7 @@
           <a:p>
             <a:fld id="{F2853615-BFDE-46DE-814C-47EC6EF6D371}" type="datetimeFigureOut">
               <a:rPr lang="el-GR" smtClean="0"/>
-              <a:t>5/5/2015</a:t>
+              <a:t>6/5/2015</a:t>
             </a:fld>
             <a:endParaRPr lang="el-GR"/>
           </a:p>
@@ -3050,7 +3055,7 @@
           <a:p>
             <a:fld id="{F2853615-BFDE-46DE-814C-47EC6EF6D371}" type="datetimeFigureOut">
               <a:rPr lang="el-GR" smtClean="0"/>
-              <a:t>5/5/2015</a:t>
+              <a:t>6/5/2015</a:t>
             </a:fld>
             <a:endParaRPr lang="el-GR"/>
           </a:p>
@@ -3237,7 +3242,7 @@
           <a:p>
             <a:fld id="{F2853615-BFDE-46DE-814C-47EC6EF6D371}" type="datetimeFigureOut">
               <a:rPr lang="el-GR" smtClean="0"/>
-              <a:t>5/5/2015</a:t>
+              <a:t>6/5/2015</a:t>
             </a:fld>
             <a:endParaRPr lang="el-GR"/>
           </a:p>
@@ -3735,6 +3740,47 @@
           <a:chExt cx="0" cy="0"/>
         </a:xfrm>
       </p:grpSpPr>
+      <p:pic>
+        <p:nvPicPr>
+          <p:cNvPr id="2050" name="Picture 2" descr="C:\Github\cs565\presentation\images\seq-simple.jpg"/>
+          <p:cNvPicPr>
+            <a:picLocks noChangeAspect="1" noChangeArrowheads="1"/>
+          </p:cNvPicPr>
+          <p:nvPr/>
+        </p:nvPicPr>
+        <p:blipFill>
+          <a:blip r:embed="rId2" cstate="print">
+            <a:extLst>
+              <a:ext uri="{28A0092B-C50C-407E-A947-70E740481C1C}">
+                <a14:useLocalDpi xmlns:a14="http://schemas.microsoft.com/office/drawing/2010/main" val="0"/>
+              </a:ext>
+            </a:extLst>
+          </a:blip>
+          <a:srcRect/>
+          <a:stretch>
+            <a:fillRect/>
+          </a:stretch>
+        </p:blipFill>
+        <p:spPr bwMode="auto">
+          <a:xfrm>
+            <a:off x="1115616" y="4293096"/>
+            <a:ext cx="6718300" cy="2470150"/>
+          </a:xfrm>
+          <a:prstGeom prst="rect">
+            <a:avLst/>
+          </a:prstGeom>
+          <a:noFill/>
+          <a:extLst>
+            <a:ext uri="{909E8E84-426E-40DD-AFC4-6F175D3DCCD1}">
+              <a14:hiddenFill xmlns:a14="http://schemas.microsoft.com/office/drawing/2010/main">
+                <a:solidFill>
+                  <a:srgbClr val="FFFFFF"/>
+                </a:solidFill>
+              </a14:hiddenFill>
+            </a:ext>
+          </a:extLst>
+        </p:spPr>
+      </p:pic>
       <p:sp>
         <p:nvSpPr>
           <p:cNvPr id="6" name="Θέση κειμένου 5"/>
@@ -3760,7 +3806,6 @@
               <a:rPr lang="en-US" dirty="0"/>
               <a:t>Petri Net (PN)</a:t>
             </a:r>
-            <a:endParaRPr lang="en-US" dirty="0"/>
           </a:p>
         </p:txBody>
       </p:sp>
@@ -3980,6 +4025,866 @@
       </p:par>
     </p:tnLst>
   </p:timing>
+</p:sld>
+</file>
+
+<file path=ppt/slides/slide11.xml><?xml version="1.0" encoding="utf-8"?>
+<p:sld xmlns:a="http://schemas.openxmlformats.org/drawingml/2006/main" xmlns:r="http://schemas.openxmlformats.org/officeDocument/2006/relationships" xmlns:p="http://schemas.openxmlformats.org/presentationml/2006/main">
+  <p:cSld>
+    <p:spTree>
+      <p:nvGrpSpPr>
+        <p:cNvPr id="1" name=""/>
+        <p:cNvGrpSpPr/>
+        <p:nvPr/>
+      </p:nvGrpSpPr>
+      <p:grpSpPr>
+        <a:xfrm>
+          <a:off x="0" y="0"/>
+          <a:ext cx="0" cy="0"/>
+          <a:chOff x="0" y="0"/>
+          <a:chExt cx="0" cy="0"/>
+        </a:xfrm>
+      </p:grpSpPr>
+      <p:pic>
+        <p:nvPicPr>
+          <p:cNvPr id="1030" name="Picture 6" descr="C:\Github\cs565\presentation\images\seq-split-join.jpg"/>
+          <p:cNvPicPr>
+            <a:picLocks noChangeAspect="1" noChangeArrowheads="1"/>
+          </p:cNvPicPr>
+          <p:nvPr/>
+        </p:nvPicPr>
+        <p:blipFill>
+          <a:blip r:embed="rId2" cstate="print">
+            <a:extLst>
+              <a:ext uri="{28A0092B-C50C-407E-A947-70E740481C1C}">
+                <a14:useLocalDpi xmlns:a14="http://schemas.microsoft.com/office/drawing/2010/main" val="0"/>
+              </a:ext>
+            </a:extLst>
+          </a:blip>
+          <a:srcRect/>
+          <a:stretch>
+            <a:fillRect/>
+          </a:stretch>
+        </p:blipFill>
+        <p:spPr bwMode="auto">
+          <a:xfrm>
+            <a:off x="4267241" y="1510556"/>
+            <a:ext cx="4697247" cy="1607294"/>
+          </a:xfrm>
+          <a:prstGeom prst="rect">
+            <a:avLst/>
+          </a:prstGeom>
+          <a:noFill/>
+          <a:extLst>
+            <a:ext uri="{909E8E84-426E-40DD-AFC4-6F175D3DCCD1}">
+              <a14:hiddenFill xmlns:a14="http://schemas.microsoft.com/office/drawing/2010/main">
+                <a:solidFill>
+                  <a:srgbClr val="FFFFFF"/>
+                </a:solidFill>
+              </a14:hiddenFill>
+            </a:ext>
+          </a:extLst>
+        </p:spPr>
+      </p:pic>
+      <p:sp>
+        <p:nvSpPr>
+          <p:cNvPr id="8" name="Θέση περιεχομένου 7"/>
+          <p:cNvSpPr>
+            <a:spLocks noGrp="1"/>
+          </p:cNvSpPr>
+          <p:nvPr>
+            <p:ph sz="half" idx="1"/>
+          </p:nvPr>
+        </p:nvSpPr>
+        <p:spPr/>
+        <p:txBody>
+          <a:bodyPr/>
+          <a:lstStyle/>
+          <a:p>
+            <a:r>
+              <a:rPr lang="en-US" dirty="0" smtClean="0"/>
+              <a:t>Choice</a:t>
+            </a:r>
+          </a:p>
+          <a:p>
+            <a:endParaRPr lang="en-US" dirty="0"/>
+          </a:p>
+          <a:p>
+            <a:pPr marL="0" indent="0">
+              <a:buNone/>
+            </a:pPr>
+            <a:endParaRPr lang="en-US" dirty="0" smtClean="0"/>
+          </a:p>
+          <a:p>
+            <a:pPr marL="0" indent="0">
+              <a:buNone/>
+            </a:pPr>
+            <a:endParaRPr lang="en-US" sz="1600" dirty="0" smtClean="0"/>
+          </a:p>
+          <a:p>
+            <a:r>
+              <a:rPr lang="en-US" dirty="0" smtClean="0"/>
+              <a:t>If-Then-Else</a:t>
+            </a:r>
+            <a:endParaRPr lang="en-US" dirty="0"/>
+          </a:p>
+        </p:txBody>
+      </p:sp>
+      <p:sp>
+        <p:nvSpPr>
+          <p:cNvPr id="9" name="Θέση περιεχομένου 8"/>
+          <p:cNvSpPr>
+            <a:spLocks noGrp="1"/>
+          </p:cNvSpPr>
+          <p:nvPr>
+            <p:ph sz="half" idx="2"/>
+          </p:nvPr>
+        </p:nvSpPr>
+        <p:spPr/>
+        <p:txBody>
+          <a:bodyPr/>
+          <a:lstStyle/>
+          <a:p>
+            <a:r>
+              <a:rPr lang="en-US" dirty="0" smtClean="0"/>
+              <a:t>Split &amp; Join</a:t>
+            </a:r>
+          </a:p>
+          <a:p>
+            <a:endParaRPr lang="en-US" dirty="0" smtClean="0"/>
+          </a:p>
+          <a:p>
+            <a:endParaRPr lang="en-US" dirty="0"/>
+          </a:p>
+          <a:p>
+            <a:endParaRPr lang="en-US" dirty="0" smtClean="0"/>
+          </a:p>
+          <a:p>
+            <a:r>
+              <a:rPr lang="en-US" dirty="0" smtClean="0"/>
+              <a:t>Iterative</a:t>
+            </a:r>
+          </a:p>
+          <a:p>
+            <a:pPr marL="0" indent="0">
+              <a:buNone/>
+            </a:pPr>
+            <a:endParaRPr lang="en-US" dirty="0"/>
+          </a:p>
+        </p:txBody>
+      </p:sp>
+      <p:sp>
+        <p:nvSpPr>
+          <p:cNvPr id="6" name="Τίτλος 5"/>
+          <p:cNvSpPr>
+            <a:spLocks noGrp="1"/>
+          </p:cNvSpPr>
+          <p:nvPr>
+            <p:ph type="title"/>
+          </p:nvPr>
+        </p:nvSpPr>
+        <p:spPr/>
+        <p:txBody>
+          <a:bodyPr/>
+          <a:lstStyle/>
+          <a:p>
+            <a:r>
+              <a:rPr lang="en-US" dirty="0" smtClean="0"/>
+              <a:t>Petri Net 3/3</a:t>
+            </a:r>
+            <a:endParaRPr lang="en-US" dirty="0"/>
+          </a:p>
+        </p:txBody>
+      </p:sp>
+      <p:pic>
+        <p:nvPicPr>
+          <p:cNvPr id="1028" name="Picture 4" descr="C:\Github\cs565\presentation\images\seq-choice.jpg"/>
+          <p:cNvPicPr>
+            <a:picLocks noChangeAspect="1" noChangeArrowheads="1"/>
+          </p:cNvPicPr>
+          <p:nvPr/>
+        </p:nvPicPr>
+        <p:blipFill>
+          <a:blip r:embed="rId3" cstate="print">
+            <a:extLst>
+              <a:ext uri="{28A0092B-C50C-407E-A947-70E740481C1C}">
+                <a14:useLocalDpi xmlns:a14="http://schemas.microsoft.com/office/drawing/2010/main" val="0"/>
+              </a:ext>
+            </a:extLst>
+          </a:blip>
+          <a:srcRect/>
+          <a:stretch>
+            <a:fillRect/>
+          </a:stretch>
+        </p:blipFill>
+        <p:spPr bwMode="auto">
+          <a:xfrm>
+            <a:off x="179512" y="1556792"/>
+            <a:ext cx="4055320" cy="1080120"/>
+          </a:xfrm>
+          <a:prstGeom prst="rect">
+            <a:avLst/>
+          </a:prstGeom>
+          <a:noFill/>
+          <a:extLst>
+            <a:ext uri="{909E8E84-426E-40DD-AFC4-6F175D3DCCD1}">
+              <a14:hiddenFill xmlns:a14="http://schemas.microsoft.com/office/drawing/2010/main">
+                <a:solidFill>
+                  <a:srgbClr val="FFFFFF"/>
+                </a:solidFill>
+              </a14:hiddenFill>
+            </a:ext>
+          </a:extLst>
+        </p:spPr>
+      </p:pic>
+      <p:pic>
+        <p:nvPicPr>
+          <p:cNvPr id="1029" name="Picture 5" descr="C:\Github\cs565\presentation\images\seq-if.jpg"/>
+          <p:cNvPicPr>
+            <a:picLocks noChangeAspect="1" noChangeArrowheads="1"/>
+          </p:cNvPicPr>
+          <p:nvPr/>
+        </p:nvPicPr>
+        <p:blipFill>
+          <a:blip r:embed="rId4" cstate="print">
+            <a:extLst>
+              <a:ext uri="{28A0092B-C50C-407E-A947-70E740481C1C}">
+                <a14:useLocalDpi xmlns:a14="http://schemas.microsoft.com/office/drawing/2010/main" val="0"/>
+              </a:ext>
+            </a:extLst>
+          </a:blip>
+          <a:srcRect/>
+          <a:stretch>
+            <a:fillRect/>
+          </a:stretch>
+        </p:blipFill>
+        <p:spPr bwMode="auto">
+          <a:xfrm>
+            <a:off x="278816" y="3573016"/>
+            <a:ext cx="4099000" cy="2317096"/>
+          </a:xfrm>
+          <a:prstGeom prst="rect">
+            <a:avLst/>
+          </a:prstGeom>
+          <a:noFill/>
+          <a:extLst>
+            <a:ext uri="{909E8E84-426E-40DD-AFC4-6F175D3DCCD1}">
+              <a14:hiddenFill xmlns:a14="http://schemas.microsoft.com/office/drawing/2010/main">
+                <a:solidFill>
+                  <a:srgbClr val="FFFFFF"/>
+                </a:solidFill>
+              </a14:hiddenFill>
+            </a:ext>
+          </a:extLst>
+        </p:spPr>
+      </p:pic>
+      <p:pic>
+        <p:nvPicPr>
+          <p:cNvPr id="1031" name="Picture 7" descr="C:\Github\cs565\presentation\images\seq-iterate.jpg"/>
+          <p:cNvPicPr>
+            <a:picLocks noChangeAspect="1" noChangeArrowheads="1"/>
+          </p:cNvPicPr>
+          <p:nvPr/>
+        </p:nvPicPr>
+        <p:blipFill>
+          <a:blip r:embed="rId5" cstate="print">
+            <a:extLst>
+              <a:ext uri="{28A0092B-C50C-407E-A947-70E740481C1C}">
+                <a14:useLocalDpi xmlns:a14="http://schemas.microsoft.com/office/drawing/2010/main" val="0"/>
+              </a:ext>
+            </a:extLst>
+          </a:blip>
+          <a:srcRect/>
+          <a:stretch>
+            <a:fillRect/>
+          </a:stretch>
+        </p:blipFill>
+        <p:spPr bwMode="auto">
+          <a:xfrm>
+            <a:off x="4528518" y="3789040"/>
+            <a:ext cx="4174692" cy="2018704"/>
+          </a:xfrm>
+          <a:prstGeom prst="rect">
+            <a:avLst/>
+          </a:prstGeom>
+          <a:noFill/>
+          <a:extLst>
+            <a:ext uri="{909E8E84-426E-40DD-AFC4-6F175D3DCCD1}">
+              <a14:hiddenFill xmlns:a14="http://schemas.microsoft.com/office/drawing/2010/main">
+                <a:solidFill>
+                  <a:srgbClr val="FFFFFF"/>
+                </a:solidFill>
+              </a14:hiddenFill>
+            </a:ext>
+          </a:extLst>
+        </p:spPr>
+      </p:pic>
+    </p:spTree>
+    <p:extLst>
+      <p:ext uri="{BB962C8B-B14F-4D97-AF65-F5344CB8AC3E}">
+        <p14:creationId xmlns:p14="http://schemas.microsoft.com/office/powerpoint/2010/main" val="567537847"/>
+      </p:ext>
+    </p:extLst>
+  </p:cSld>
+  <p:clrMapOvr>
+    <a:masterClrMapping/>
+  </p:clrMapOvr>
+  <p:timing>
+    <p:tnLst>
+      <p:par>
+        <p:cTn id="1" dur="indefinite" restart="never" nodeType="tmRoot"/>
+      </p:par>
+    </p:tnLst>
+  </p:timing>
+</p:sld>
+</file>
+
+<file path=ppt/slides/slide12.xml><?xml version="1.0" encoding="utf-8"?>
+<p:sld xmlns:a="http://schemas.openxmlformats.org/drawingml/2006/main" xmlns:r="http://schemas.openxmlformats.org/officeDocument/2006/relationships" xmlns:p="http://schemas.openxmlformats.org/presentationml/2006/main">
+  <p:cSld>
+    <p:spTree>
+      <p:nvGrpSpPr>
+        <p:cNvPr id="1" name=""/>
+        <p:cNvGrpSpPr/>
+        <p:nvPr/>
+      </p:nvGrpSpPr>
+      <p:grpSpPr>
+        <a:xfrm>
+          <a:off x="0" y="0"/>
+          <a:ext cx="0" cy="0"/>
+          <a:chOff x="0" y="0"/>
+          <a:chExt cx="0" cy="0"/>
+        </a:xfrm>
+      </p:grpSpPr>
+      <p:sp>
+        <p:nvSpPr>
+          <p:cNvPr id="4" name="Τίτλος 3"/>
+          <p:cNvSpPr>
+            <a:spLocks noGrp="1"/>
+          </p:cNvSpPr>
+          <p:nvPr>
+            <p:ph type="title"/>
+          </p:nvPr>
+        </p:nvSpPr>
+        <p:spPr/>
+        <p:txBody>
+          <a:bodyPr>
+            <a:normAutofit fontScale="90000"/>
+          </a:bodyPr>
+          <a:lstStyle/>
+          <a:p>
+            <a:r>
+              <a:rPr lang="en-US" dirty="0"/>
+              <a:t>Analysis of Web Services using Petri Net</a:t>
+            </a:r>
+            <a:endParaRPr lang="en-US" dirty="0"/>
+          </a:p>
+        </p:txBody>
+      </p:sp>
+      <p:sp>
+        <p:nvSpPr>
+          <p:cNvPr id="5" name="Θέση περιεχομένου 4"/>
+          <p:cNvSpPr>
+            <a:spLocks noGrp="1"/>
+          </p:cNvSpPr>
+          <p:nvPr>
+            <p:ph idx="1"/>
+          </p:nvPr>
+        </p:nvSpPr>
+        <p:spPr/>
+        <p:txBody>
+          <a:bodyPr>
+            <a:normAutofit/>
+          </a:bodyPr>
+          <a:lstStyle/>
+          <a:p>
+            <a:r>
+              <a:rPr lang="en-US" b="1" dirty="0" smtClean="0"/>
+              <a:t>Simulation</a:t>
+            </a:r>
+            <a:r>
+              <a:rPr lang="en-US" dirty="0" smtClean="0"/>
+              <a:t> – </a:t>
+            </a:r>
+            <a:r>
+              <a:rPr lang="en-US" sz="2400" i="1" dirty="0" smtClean="0"/>
+              <a:t>Simulate the evolution of a Web service under different conditions</a:t>
+            </a:r>
+            <a:endParaRPr lang="en-US" i="1" dirty="0" smtClean="0"/>
+          </a:p>
+          <a:p>
+            <a:r>
+              <a:rPr lang="en-US" b="1" dirty="0" smtClean="0"/>
+              <a:t>Validation</a:t>
+            </a:r>
+            <a:r>
+              <a:rPr lang="en-US" dirty="0" smtClean="0"/>
+              <a:t> – </a:t>
+            </a:r>
+            <a:r>
+              <a:rPr lang="en-US" sz="2400" i="1" dirty="0" smtClean="0"/>
+              <a:t>Test whether a service behaves as expected</a:t>
+            </a:r>
+          </a:p>
+          <a:p>
+            <a:r>
+              <a:rPr lang="en-US" b="1" dirty="0" smtClean="0"/>
+              <a:t>Verification</a:t>
+            </a:r>
+            <a:r>
+              <a:rPr lang="en-US" dirty="0" smtClean="0"/>
+              <a:t> – </a:t>
+            </a:r>
+            <a:r>
+              <a:rPr lang="en-US" sz="2400" i="1" dirty="0" smtClean="0"/>
+              <a:t>Establish the upholding of properties</a:t>
+            </a:r>
+          </a:p>
+          <a:p>
+            <a:r>
+              <a:rPr lang="en-US" b="1" dirty="0" smtClean="0"/>
+              <a:t>Composition</a:t>
+            </a:r>
+            <a:r>
+              <a:rPr lang="en-US" dirty="0" smtClean="0"/>
+              <a:t> – </a:t>
+            </a:r>
+            <a:r>
+              <a:rPr lang="en-US" sz="2400" i="1" dirty="0" smtClean="0"/>
+              <a:t>Generate a composition of services that achieves a specific goal</a:t>
+            </a:r>
+          </a:p>
+          <a:p>
+            <a:r>
+              <a:rPr lang="en-US" b="1" dirty="0" smtClean="0"/>
+              <a:t>Performance Analysis </a:t>
+            </a:r>
+            <a:r>
+              <a:rPr lang="en-US" dirty="0" smtClean="0"/>
+              <a:t>– </a:t>
+            </a:r>
+            <a:r>
+              <a:rPr lang="en-US" sz="2400" i="1" dirty="0" smtClean="0"/>
+              <a:t>Evaluate the ability of a service to meet </a:t>
+            </a:r>
+            <a:r>
+              <a:rPr lang="en-US" sz="2400" i="1" dirty="0" err="1" smtClean="0"/>
+              <a:t>requirments</a:t>
+            </a:r>
+            <a:endParaRPr lang="en-US" i="1" dirty="0"/>
+          </a:p>
+        </p:txBody>
+      </p:sp>
+    </p:spTree>
+    <p:extLst>
+      <p:ext uri="{BB962C8B-B14F-4D97-AF65-F5344CB8AC3E}">
+        <p14:creationId xmlns:p14="http://schemas.microsoft.com/office/powerpoint/2010/main" val="1439535555"/>
+      </p:ext>
+    </p:extLst>
+  </p:cSld>
+  <p:clrMapOvr>
+    <a:masterClrMapping/>
+  </p:clrMapOvr>
+  <p:timing>
+    <p:tnLst>
+      <p:par>
+        <p:cTn id="1" dur="indefinite" restart="never" nodeType="tmRoot"/>
+      </p:par>
+    </p:tnLst>
+  </p:timing>
+</p:sld>
+</file>
+
+<file path=ppt/slides/slide13.xml><?xml version="1.0" encoding="utf-8"?>
+<p:sld xmlns:a="http://schemas.openxmlformats.org/drawingml/2006/main" xmlns:r="http://schemas.openxmlformats.org/officeDocument/2006/relationships" xmlns:p="http://schemas.openxmlformats.org/presentationml/2006/main">
+  <p:cSld>
+    <p:spTree>
+      <p:nvGrpSpPr>
+        <p:cNvPr id="1" name=""/>
+        <p:cNvGrpSpPr/>
+        <p:nvPr/>
+      </p:nvGrpSpPr>
+      <p:grpSpPr>
+        <a:xfrm>
+          <a:off x="0" y="0"/>
+          <a:ext cx="0" cy="0"/>
+          <a:chOff x="0" y="0"/>
+          <a:chExt cx="0" cy="0"/>
+        </a:xfrm>
+      </p:grpSpPr>
+      <p:sp>
+        <p:nvSpPr>
+          <p:cNvPr id="2" name="Τίτλος 1"/>
+          <p:cNvSpPr>
+            <a:spLocks noGrp="1"/>
+          </p:cNvSpPr>
+          <p:nvPr>
+            <p:ph type="title"/>
+          </p:nvPr>
+        </p:nvSpPr>
+        <p:spPr/>
+        <p:txBody>
+          <a:bodyPr/>
+          <a:lstStyle/>
+          <a:p>
+            <a:r>
+              <a:rPr lang="en-US" dirty="0" smtClean="0"/>
+              <a:t>Challenges of Verification</a:t>
+            </a:r>
+            <a:endParaRPr lang="en-US" dirty="0"/>
+          </a:p>
+        </p:txBody>
+      </p:sp>
+      <p:sp>
+        <p:nvSpPr>
+          <p:cNvPr id="3" name="Θέση περιεχομένου 2"/>
+          <p:cNvSpPr>
+            <a:spLocks noGrp="1"/>
+          </p:cNvSpPr>
+          <p:nvPr>
+            <p:ph idx="1"/>
+          </p:nvPr>
+        </p:nvSpPr>
+        <p:spPr/>
+        <p:txBody>
+          <a:bodyPr/>
+          <a:lstStyle/>
+          <a:p>
+            <a:r>
+              <a:rPr lang="en-US" dirty="0" smtClean="0"/>
+              <a:t>Reachability</a:t>
+            </a:r>
+          </a:p>
+          <a:p>
+            <a:pPr marL="0" indent="0">
+              <a:buNone/>
+            </a:pPr>
+            <a:endParaRPr lang="en-US" dirty="0" smtClean="0"/>
+          </a:p>
+          <a:p>
+            <a:r>
+              <a:rPr lang="en-US" sz="3600" dirty="0"/>
+              <a:t>Safety</a:t>
+            </a:r>
+            <a:r>
+              <a:rPr lang="en-US" dirty="0"/>
+              <a:t> </a:t>
+            </a:r>
+            <a:r>
+              <a:rPr lang="en-US" sz="2800" i="1" dirty="0"/>
+              <a:t>of a distributed system is </a:t>
+            </a:r>
+            <a:r>
+              <a:rPr lang="en-US" sz="2800" i="1" dirty="0" err="1"/>
+              <a:t>dened</a:t>
+            </a:r>
+            <a:r>
+              <a:rPr lang="en-US" sz="2800" i="1" dirty="0"/>
+              <a:t> as lack of reachability to </a:t>
+            </a:r>
+            <a:r>
+              <a:rPr lang="en-US" sz="2800" i="1" dirty="0" smtClean="0"/>
+              <a:t>an unsafe state</a:t>
+            </a:r>
+          </a:p>
+          <a:p>
+            <a:endParaRPr lang="en-US" i="1" dirty="0"/>
+          </a:p>
+          <a:p>
+            <a:r>
+              <a:rPr lang="en-US" dirty="0"/>
+              <a:t>Safety of Web Service </a:t>
+            </a:r>
+            <a:r>
+              <a:rPr lang="en-US" dirty="0" smtClean="0"/>
+              <a:t>Compositions</a:t>
+            </a:r>
+          </a:p>
+          <a:p>
+            <a:endParaRPr lang="en-US" dirty="0"/>
+          </a:p>
+          <a:p>
+            <a:r>
+              <a:rPr lang="en-US" dirty="0"/>
+              <a:t>Automated Composition of Web Services</a:t>
+            </a:r>
+            <a:endParaRPr lang="en-US" dirty="0"/>
+          </a:p>
+        </p:txBody>
+      </p:sp>
+    </p:spTree>
+    <p:extLst>
+      <p:ext uri="{BB962C8B-B14F-4D97-AF65-F5344CB8AC3E}">
+        <p14:creationId xmlns:p14="http://schemas.microsoft.com/office/powerpoint/2010/main" val="2944510001"/>
+      </p:ext>
+    </p:extLst>
+  </p:cSld>
+  <p:clrMapOvr>
+    <a:masterClrMapping/>
+  </p:clrMapOvr>
+  <p:timing>
+    <p:tnLst>
+      <p:par>
+        <p:cTn id="1" dur="indefinite" restart="never" nodeType="tmRoot"/>
+      </p:par>
+    </p:tnLst>
+  </p:timing>
+</p:sld>
+</file>
+
+<file path=ppt/slides/slide14.xml><?xml version="1.0" encoding="utf-8"?>
+<p:sld xmlns:a="http://schemas.openxmlformats.org/drawingml/2006/main" xmlns:r="http://schemas.openxmlformats.org/officeDocument/2006/relationships" xmlns:p="http://schemas.openxmlformats.org/presentationml/2006/main">
+  <p:cSld>
+    <p:spTree>
+      <p:nvGrpSpPr>
+        <p:cNvPr id="1" name=""/>
+        <p:cNvGrpSpPr/>
+        <p:nvPr/>
+      </p:nvGrpSpPr>
+      <p:grpSpPr>
+        <a:xfrm>
+          <a:off x="0" y="0"/>
+          <a:ext cx="0" cy="0"/>
+          <a:chOff x="0" y="0"/>
+          <a:chExt cx="0" cy="0"/>
+        </a:xfrm>
+      </p:grpSpPr>
+      <p:sp>
+        <p:nvSpPr>
+          <p:cNvPr id="2" name="Τίτλος 1"/>
+          <p:cNvSpPr>
+            <a:spLocks noGrp="1"/>
+          </p:cNvSpPr>
+          <p:nvPr>
+            <p:ph type="title"/>
+          </p:nvPr>
+        </p:nvSpPr>
+        <p:spPr/>
+        <p:txBody>
+          <a:bodyPr/>
+          <a:lstStyle/>
+          <a:p>
+            <a:r>
+              <a:rPr lang="en-US" dirty="0"/>
+              <a:t>Complexity of DAML-S services tasks</a:t>
+            </a:r>
+            <a:endParaRPr lang="en-US" dirty="0"/>
+          </a:p>
+        </p:txBody>
+      </p:sp>
+      <p:sp>
+        <p:nvSpPr>
+          <p:cNvPr id="3" name="Θέση περιεχομένου 2"/>
+          <p:cNvSpPr>
+            <a:spLocks noGrp="1"/>
+          </p:cNvSpPr>
+          <p:nvPr>
+            <p:ph idx="1"/>
+          </p:nvPr>
+        </p:nvSpPr>
+        <p:spPr/>
+        <p:txBody>
+          <a:bodyPr/>
+          <a:lstStyle/>
+          <a:p>
+            <a:endParaRPr lang="en-US" dirty="0"/>
+          </a:p>
+        </p:txBody>
+      </p:sp>
+      <p:pic>
+        <p:nvPicPr>
+          <p:cNvPr id="3074" name="Picture 2" descr="C:\Github\cs565\presentation\images\DAML-S-evaluation.png"/>
+          <p:cNvPicPr>
+            <a:picLocks noChangeAspect="1" noChangeArrowheads="1"/>
+          </p:cNvPicPr>
+          <p:nvPr/>
+        </p:nvPicPr>
+        <p:blipFill>
+          <a:blip r:embed="rId2">
+            <a:extLst>
+              <a:ext uri="{28A0092B-C50C-407E-A947-70E740481C1C}">
+                <a14:useLocalDpi xmlns:a14="http://schemas.microsoft.com/office/drawing/2010/main" val="0"/>
+              </a:ext>
+            </a:extLst>
+          </a:blip>
+          <a:srcRect/>
+          <a:stretch>
+            <a:fillRect/>
+          </a:stretch>
+        </p:blipFill>
+        <p:spPr bwMode="auto">
+          <a:xfrm>
+            <a:off x="331627" y="2348880"/>
+            <a:ext cx="8488845" cy="1994024"/>
+          </a:xfrm>
+          <a:prstGeom prst="rect">
+            <a:avLst/>
+          </a:prstGeom>
+          <a:noFill/>
+          <a:extLst>
+            <a:ext uri="{909E8E84-426E-40DD-AFC4-6F175D3DCCD1}">
+              <a14:hiddenFill xmlns:a14="http://schemas.microsoft.com/office/drawing/2010/main">
+                <a:solidFill>
+                  <a:srgbClr val="FFFFFF"/>
+                </a:solidFill>
+              </a14:hiddenFill>
+            </a:ext>
+          </a:extLst>
+        </p:spPr>
+      </p:pic>
+    </p:spTree>
+    <p:extLst>
+      <p:ext uri="{BB962C8B-B14F-4D97-AF65-F5344CB8AC3E}">
+        <p14:creationId xmlns:p14="http://schemas.microsoft.com/office/powerpoint/2010/main" val="4153335233"/>
+      </p:ext>
+    </p:extLst>
+  </p:cSld>
+  <p:clrMapOvr>
+    <a:masterClrMapping/>
+  </p:clrMapOvr>
+  <p:timing>
+    <p:tnLst>
+      <p:par>
+        <p:cTn id="1" dur="indefinite" restart="never" nodeType="tmRoot"/>
+      </p:par>
+    </p:tnLst>
+  </p:timing>
+</p:sld>
+</file>
+
+<file path=ppt/slides/slide15.xml><?xml version="1.0" encoding="utf-8"?>
+<p:sld xmlns:a="http://schemas.openxmlformats.org/drawingml/2006/main" xmlns:r="http://schemas.openxmlformats.org/officeDocument/2006/relationships" xmlns:p="http://schemas.openxmlformats.org/presentationml/2006/main">
+  <p:cSld>
+    <p:spTree>
+      <p:nvGrpSpPr>
+        <p:cNvPr id="1" name=""/>
+        <p:cNvGrpSpPr/>
+        <p:nvPr/>
+      </p:nvGrpSpPr>
+      <p:grpSpPr>
+        <a:xfrm>
+          <a:off x="0" y="0"/>
+          <a:ext cx="0" cy="0"/>
+          <a:chOff x="0" y="0"/>
+          <a:chExt cx="0" cy="0"/>
+        </a:xfrm>
+      </p:grpSpPr>
+      <p:sp>
+        <p:nvSpPr>
+          <p:cNvPr id="2" name="Τίτλος 1"/>
+          <p:cNvSpPr>
+            <a:spLocks noGrp="1"/>
+          </p:cNvSpPr>
+          <p:nvPr>
+            <p:ph type="title"/>
+          </p:nvPr>
+        </p:nvSpPr>
+        <p:spPr/>
+        <p:txBody>
+          <a:bodyPr/>
+          <a:lstStyle/>
+          <a:p>
+            <a:r>
+              <a:rPr lang="en-US" dirty="0" smtClean="0"/>
+              <a:t>Implementations</a:t>
+            </a:r>
+            <a:endParaRPr lang="en-US" dirty="0"/>
+          </a:p>
+        </p:txBody>
+      </p:sp>
+      <p:sp>
+        <p:nvSpPr>
+          <p:cNvPr id="3" name="Θέση περιεχομένου 2"/>
+          <p:cNvSpPr>
+            <a:spLocks noGrp="1"/>
+          </p:cNvSpPr>
+          <p:nvPr>
+            <p:ph idx="1"/>
+          </p:nvPr>
+        </p:nvSpPr>
+        <p:spPr/>
+        <p:txBody>
+          <a:bodyPr/>
+          <a:lstStyle/>
+          <a:p>
+            <a:pPr marL="0" indent="0">
+              <a:buNone/>
+            </a:pPr>
+            <a:r>
+              <a:rPr lang="en-US" dirty="0" smtClean="0"/>
+              <a:t>Simulation, Verification </a:t>
+            </a:r>
+            <a:r>
+              <a:rPr lang="en-US" dirty="0"/>
+              <a:t>and Automated Composition of Web </a:t>
+            </a:r>
+            <a:r>
+              <a:rPr lang="en-US" dirty="0" smtClean="0"/>
+              <a:t>Services -  </a:t>
+            </a:r>
+            <a:r>
+              <a:rPr lang="en-US" sz="2400" i="1" dirty="0" smtClean="0"/>
+              <a:t>Narayanan, </a:t>
+            </a:r>
+            <a:r>
+              <a:rPr lang="en-US" sz="2400" i="1" dirty="0" err="1" smtClean="0"/>
+              <a:t>McIlraith</a:t>
+            </a:r>
+            <a:endParaRPr lang="en-US" sz="2400" i="1" dirty="0" smtClean="0"/>
+          </a:p>
+          <a:p>
+            <a:pPr marL="0" indent="0">
+              <a:buNone/>
+            </a:pPr>
+            <a:endParaRPr lang="en-US" sz="2400" i="1" dirty="0"/>
+          </a:p>
+          <a:p>
+            <a:r>
+              <a:rPr lang="en-US" sz="2800" dirty="0" smtClean="0"/>
+              <a:t>A Java DAML-S Interpreter</a:t>
+            </a:r>
+          </a:p>
+          <a:p>
+            <a:endParaRPr lang="en-US" sz="2800" dirty="0" smtClean="0"/>
+          </a:p>
+          <a:p>
+            <a:r>
+              <a:rPr lang="en-US" sz="2800" dirty="0" smtClean="0"/>
+              <a:t>DAML-S limited markup language</a:t>
+            </a:r>
+          </a:p>
+          <a:p>
+            <a:endParaRPr lang="en-US" sz="2800" dirty="0" smtClean="0"/>
+          </a:p>
+          <a:p>
+            <a:r>
+              <a:rPr lang="en-US" sz="2800" dirty="0" smtClean="0"/>
+              <a:t>Modeling environment </a:t>
+            </a:r>
+            <a:r>
+              <a:rPr lang="en-US" sz="2800" dirty="0" err="1" smtClean="0"/>
+              <a:t>KarmaSIM</a:t>
+            </a:r>
+            <a:endParaRPr lang="en-US" sz="2800" dirty="0" smtClean="0"/>
+          </a:p>
+          <a:p>
+            <a:endParaRPr lang="en-US" sz="2400" dirty="0"/>
+          </a:p>
+          <a:p>
+            <a:endParaRPr lang="en-US" sz="2800" dirty="0"/>
+          </a:p>
+        </p:txBody>
+      </p:sp>
+    </p:spTree>
+    <p:extLst>
+      <p:ext uri="{BB962C8B-B14F-4D97-AF65-F5344CB8AC3E}">
+        <p14:creationId xmlns:p14="http://schemas.microsoft.com/office/powerpoint/2010/main" val="998036582"/>
+      </p:ext>
+    </p:extLst>
+  </p:cSld>
+  <p:clrMapOvr>
+    <a:masterClrMapping/>
+  </p:clrMapOvr>
 </p:sld>
 </file>
 
@@ -4816,7 +5721,6 @@
               <a:rPr lang="en-US" dirty="0"/>
               <a:t>using third-party ontologies</a:t>
             </a:r>
-            <a:endParaRPr lang="en-US" dirty="0"/>
           </a:p>
           <a:p>
             <a:endParaRPr lang="en-US" dirty="0" smtClean="0"/>
@@ -5694,7 +6598,6 @@
               <a:rPr lang="en-US" dirty="0"/>
               <a:t>Situation Calculus</a:t>
             </a:r>
-            <a:endParaRPr lang="en-US" dirty="0"/>
           </a:p>
         </p:txBody>
       </p:sp>
@@ -5996,7 +6899,6 @@
               <a:rPr lang="en-US" sz="2800" dirty="0"/>
               <a:t>in a distributed environment.</a:t>
             </a:r>
-            <a:endParaRPr lang="en-US" sz="2800" dirty="0"/>
           </a:p>
         </p:txBody>
       </p:sp>

</xml_diff>